<commit_message>
gom rework no multi
</commit_message>
<xml_diff>
--- a/projects/kog.020.040-ortho/3gre055_2Dcam.pptx
+++ b/projects/kog.020.040-ortho/3gre055_2Dcam.pptx
@@ -5,7 +5,7 @@
     <p:sldMasterId id="2147483669" r:id="rId1"/>
   </p:sldMasterIdLst>
   <p:notesMasterIdLst>
-    <p:notesMasterId r:id="rId16"/>
+    <p:notesMasterId r:id="rId15"/>
   </p:notesMasterIdLst>
   <p:sldIdLst>
     <p:sldId id="256" r:id="rId2"/>
@@ -21,7 +21,6 @@
     <p:sldId id="582" r:id="rId12"/>
     <p:sldId id="583" r:id="rId13"/>
     <p:sldId id="584" r:id="rId14"/>
-    <p:sldId id="585" r:id="rId15"/>
   </p:sldIdLst>
   <p:sldSz cx="9144000" cy="6858000" type="screen4x3"/>
   <p:notesSz cx="6858000" cy="9144000"/>
@@ -210,7 +209,7 @@
           <a:p>
             <a:fld id="{9CB53498-0D27-4BA1-B64E-F3F0DF81F6FC}" type="datetimeFigureOut">
               <a:rPr lang="en-US" smtClean="0"/>
-              <a:t>3/2/2021</a:t>
+              <a:t>10/5/2021</a:t>
             </a:fld>
             <a:endParaRPr lang="en-US"/>
           </a:p>
@@ -1648,7 +1647,7 @@
           <a:p>
             <a:fld id="{233D5BDB-207A-4240-9DD0-70E5211C08C1}" type="datetimeFigureOut">
               <a:rPr lang="en-US" smtClean="0"/>
-              <a:t>3/2/2021</a:t>
+              <a:t>10/5/2021</a:t>
             </a:fld>
             <a:endParaRPr lang="en-US"/>
           </a:p>
@@ -4371,7 +4370,7 @@
             <a:fld id="{233D5BDB-207A-4240-9DD0-70E5211C08C1}" type="datetimeFigureOut">
               <a:rPr lang="en-US" smtClean="0"/>
               <a:pPr/>
-              <a:t>3/2/2021</a:t>
+              <a:t>10/5/2021</a:t>
             </a:fld>
             <a:endParaRPr lang="en-US"/>
           </a:p>
@@ -8591,17 +8590,17 @@
               <a:t>  </a:t>
             </a:r>
             <a:r>
-              <a:rPr lang="en-US" dirty="0" err="1">
+              <a:rPr lang="en-US" dirty="0" err="1" smtClean="0">
                 <a:solidFill>
                   <a:srgbClr val="C70040"/>
                 </a:solidFill>
                 <a:ea typeface="Times New Roman" panose="02020603050405020304" pitchFamily="18" charset="0"/>
                 <a:cs typeface="Times New Roman" panose="02020603050405020304" pitchFamily="18" charset="0"/>
               </a:rPr>
-              <a:t>val</a:t>
+              <a:t>var</a:t>
             </a:r>
             <a:r>
-              <a:rPr lang="en-US" dirty="0">
+              <a:rPr lang="en-US" dirty="0" smtClean="0">
                 <a:solidFill>
                   <a:srgbClr val="C70040"/>
                 </a:solidFill>
@@ -10452,7 +10451,27 @@
                 <a:ea typeface="Times New Roman" panose="02020603050405020304" pitchFamily="18" charset="0"/>
                 <a:cs typeface="Times New Roman" panose="02020603050405020304" pitchFamily="18" charset="0"/>
               </a:rPr>
-              <a:t> camera </a:t>
+              <a:t> </a:t>
+            </a:r>
+            <a:r>
+              <a:rPr lang="en-US" dirty="0" smtClean="0">
+                <a:solidFill>
+                  <a:srgbClr val="000000"/>
+                </a:solidFill>
+                <a:ea typeface="Times New Roman" panose="02020603050405020304" pitchFamily="18" charset="0"/>
+                <a:cs typeface="Times New Roman" panose="02020603050405020304" pitchFamily="18" charset="0"/>
+              </a:rPr>
+              <a:t>this, </a:t>
+            </a:r>
+            <a:r>
+              <a:rPr lang="hu-HU" dirty="0" smtClean="0">
+                <a:solidFill>
+                  <a:srgbClr val="000000"/>
+                </a:solidFill>
+                <a:ea typeface="Times New Roman" panose="02020603050405020304" pitchFamily="18" charset="0"/>
+                <a:cs typeface="Times New Roman" panose="02020603050405020304" pitchFamily="18" charset="0"/>
+              </a:rPr>
+              <a:t>camera </a:t>
             </a:r>
             <a:r>
               <a:rPr lang="en-US" dirty="0">
@@ -10777,645 +10796,6 @@
     <p:extLst>
       <p:ext uri="{BB962C8B-B14F-4D97-AF65-F5344CB8AC3E}">
         <p14:creationId xmlns:p14="http://schemas.microsoft.com/office/powerpoint/2010/main" val="3699040996"/>
-      </p:ext>
-    </p:extLst>
-  </p:cSld>
-  <p:clrMapOvr>
-    <a:masterClrMapping/>
-  </p:clrMapOvr>
-</p:sld>
-</file>
-
-<file path=ppt/slides/slide14.xml><?xml version="1.0" encoding="utf-8"?>
-<p:sld xmlns:a="http://schemas.openxmlformats.org/drawingml/2006/main" xmlns:r="http://schemas.openxmlformats.org/officeDocument/2006/relationships" xmlns:p="http://schemas.openxmlformats.org/presentationml/2006/main">
-  <p:cSld>
-    <p:spTree>
-      <p:nvGrpSpPr>
-        <p:cNvPr id="1" name=""/>
-        <p:cNvGrpSpPr/>
-        <p:nvPr/>
-      </p:nvGrpSpPr>
-      <p:grpSpPr>
-        <a:xfrm>
-          <a:off x="0" y="0"/>
-          <a:ext cx="0" cy="0"/>
-          <a:chOff x="0" y="0"/>
-          <a:chExt cx="0" cy="0"/>
-        </a:xfrm>
-      </p:grpSpPr>
-      <p:sp>
-        <p:nvSpPr>
-          <p:cNvPr id="4" name="Title 3"/>
-          <p:cNvSpPr>
-            <a:spLocks noGrp="1"/>
-          </p:cNvSpPr>
-          <p:nvPr>
-            <p:ph type="title"/>
-          </p:nvPr>
-        </p:nvSpPr>
-        <p:spPr/>
-        <p:txBody>
-          <a:bodyPr/>
-          <a:lstStyle/>
-          <a:p>
-            <a:r>
-              <a:rPr lang="en-US" sz="4000" dirty="0">
-                <a:latin typeface="Consolas" panose="020B0609020204030204" pitchFamily="49" charset="0"/>
-                <a:cs typeface="Consolas" panose="020B0609020204030204" pitchFamily="49" charset="0"/>
-              </a:rPr>
-              <a:t>Scene</a:t>
-            </a:r>
-            <a:endParaRPr lang="en-US" dirty="0">
-              <a:latin typeface="Consolas" panose="020B0609020204030204" pitchFamily="49" charset="0"/>
-              <a:cs typeface="Consolas" panose="020B0609020204030204" pitchFamily="49" charset="0"/>
-            </a:endParaRPr>
-          </a:p>
-        </p:txBody>
-      </p:sp>
-      <p:sp>
-        <p:nvSpPr>
-          <p:cNvPr id="5" name="Content Placeholder 4"/>
-          <p:cNvSpPr>
-            <a:spLocks noGrp="1"/>
-          </p:cNvSpPr>
-          <p:nvPr>
-            <p:ph idx="1"/>
-          </p:nvPr>
-        </p:nvSpPr>
-        <p:spPr/>
-        <p:txBody>
-          <a:bodyPr>
-            <a:normAutofit/>
-          </a:bodyPr>
-          <a:lstStyle/>
-          <a:p>
-            <a:pPr>
-              <a:lnSpc>
-                <a:spcPct val="107000"/>
-              </a:lnSpc>
-              <a:spcAft>
-                <a:spcPts val="0"/>
-              </a:spcAft>
-              <a:tabLst>
-                <a:tab pos="581660" algn="l"/>
-                <a:tab pos="1163320" algn="l"/>
-                <a:tab pos="1744980" algn="l"/>
-                <a:tab pos="2326640" algn="l"/>
-                <a:tab pos="2908300" algn="l"/>
-                <a:tab pos="3489960" algn="l"/>
-                <a:tab pos="4071620" algn="l"/>
-                <a:tab pos="4653280" algn="l"/>
-                <a:tab pos="5234940" algn="l"/>
-                <a:tab pos="5816600" algn="l"/>
-                <a:tab pos="6398260" algn="l"/>
-                <a:tab pos="6979920" algn="l"/>
-                <a:tab pos="7561580" algn="l"/>
-                <a:tab pos="8143240" algn="l"/>
-                <a:tab pos="8724900" algn="l"/>
-                <a:tab pos="9306560" algn="l"/>
-              </a:tabLst>
-            </a:pPr>
-            <a:r>
-              <a:rPr lang="en-US" sz="2800" dirty="0">
-                <a:solidFill>
-                  <a:srgbClr val="C70040"/>
-                </a:solidFill>
-                <a:ea typeface="Times New Roman" panose="02020603050405020304" pitchFamily="18" charset="0"/>
-              </a:rPr>
-              <a:t>class </a:t>
-            </a:r>
-            <a:r>
-              <a:rPr lang="en-US" sz="2800" dirty="0">
-                <a:solidFill>
-                  <a:srgbClr val="000000"/>
-                </a:solidFill>
-                <a:ea typeface="Times New Roman" panose="02020603050405020304" pitchFamily="18" charset="0"/>
-              </a:rPr>
-              <a:t>Scene (</a:t>
-            </a:r>
-            <a:endParaRPr lang="en-US" sz="2800" dirty="0">
-              <a:ea typeface="Calibri" panose="020F0502020204030204" pitchFamily="34" charset="0"/>
-            </a:endParaRPr>
-          </a:p>
-          <a:p>
-            <a:pPr>
-              <a:lnSpc>
-                <a:spcPct val="107000"/>
-              </a:lnSpc>
-              <a:spcAft>
-                <a:spcPts val="0"/>
-              </a:spcAft>
-              <a:tabLst>
-                <a:tab pos="581660" algn="l"/>
-                <a:tab pos="1163320" algn="l"/>
-                <a:tab pos="1744980" algn="l"/>
-                <a:tab pos="2326640" algn="l"/>
-                <a:tab pos="2908300" algn="l"/>
-                <a:tab pos="3489960" algn="l"/>
-                <a:tab pos="4071620" algn="l"/>
-                <a:tab pos="4653280" algn="l"/>
-                <a:tab pos="5234940" algn="l"/>
-                <a:tab pos="5816600" algn="l"/>
-                <a:tab pos="6398260" algn="l"/>
-                <a:tab pos="6979920" algn="l"/>
-                <a:tab pos="7561580" algn="l"/>
-                <a:tab pos="8143240" algn="l"/>
-                <a:tab pos="8724900" algn="l"/>
-                <a:tab pos="9306560" algn="l"/>
-              </a:tabLst>
-            </a:pPr>
-            <a:r>
-              <a:rPr lang="en-US" sz="2800" dirty="0">
-                <a:solidFill>
-                  <a:srgbClr val="000000"/>
-                </a:solidFill>
-                <a:ea typeface="Times New Roman" panose="02020603050405020304" pitchFamily="18" charset="0"/>
-              </a:rPr>
-              <a:t>  </a:t>
-            </a:r>
-            <a:r>
-              <a:rPr lang="en-US" sz="2800" dirty="0" err="1">
-                <a:solidFill>
-                  <a:srgbClr val="C70040"/>
-                </a:solidFill>
-                <a:ea typeface="Times New Roman" panose="02020603050405020304" pitchFamily="18" charset="0"/>
-              </a:rPr>
-              <a:t>val</a:t>
-            </a:r>
-            <a:r>
-              <a:rPr lang="en-US" sz="2800" dirty="0">
-                <a:solidFill>
-                  <a:srgbClr val="C70040"/>
-                </a:solidFill>
-                <a:ea typeface="Times New Roman" panose="02020603050405020304" pitchFamily="18" charset="0"/>
-              </a:rPr>
-              <a:t> </a:t>
-            </a:r>
-            <a:r>
-              <a:rPr lang="en-US" sz="2800" i="1" dirty="0" err="1">
-                <a:solidFill>
-                  <a:srgbClr val="CB6500"/>
-                </a:solidFill>
-                <a:ea typeface="Times New Roman" panose="02020603050405020304" pitchFamily="18" charset="0"/>
-              </a:rPr>
-              <a:t>gl</a:t>
-            </a:r>
-            <a:r>
-              <a:rPr lang="en-US" sz="2800" i="1" dirty="0">
-                <a:solidFill>
-                  <a:srgbClr val="CB6500"/>
-                </a:solidFill>
-                <a:ea typeface="Times New Roman" panose="02020603050405020304" pitchFamily="18" charset="0"/>
-              </a:rPr>
-              <a:t> </a:t>
-            </a:r>
-            <a:r>
-              <a:rPr lang="en-US" sz="2800" dirty="0">
-                <a:solidFill>
-                  <a:srgbClr val="C70040"/>
-                </a:solidFill>
-                <a:ea typeface="Times New Roman" panose="02020603050405020304" pitchFamily="18" charset="0"/>
-              </a:rPr>
-              <a:t>: </a:t>
-            </a:r>
-            <a:r>
-              <a:rPr lang="en-US" sz="2800" dirty="0">
-                <a:solidFill>
-                  <a:srgbClr val="000000"/>
-                </a:solidFill>
-                <a:ea typeface="Times New Roman" panose="02020603050405020304" pitchFamily="18" charset="0"/>
-              </a:rPr>
-              <a:t>WebGL2RenderingContext) </a:t>
-            </a:r>
-            <a:r>
-              <a:rPr lang="en-US" sz="2800" dirty="0">
-                <a:solidFill>
-                  <a:srgbClr val="C70040"/>
-                </a:solidFill>
-                <a:ea typeface="Times New Roman" panose="02020603050405020304" pitchFamily="18" charset="0"/>
-              </a:rPr>
-              <a:t>:  </a:t>
-            </a:r>
-          </a:p>
-          <a:p>
-            <a:pPr>
-              <a:lnSpc>
-                <a:spcPct val="107000"/>
-              </a:lnSpc>
-              <a:spcAft>
-                <a:spcPts val="0"/>
-              </a:spcAft>
-              <a:tabLst>
-                <a:tab pos="581660" algn="l"/>
-                <a:tab pos="1163320" algn="l"/>
-                <a:tab pos="1744980" algn="l"/>
-                <a:tab pos="2326640" algn="l"/>
-                <a:tab pos="2908300" algn="l"/>
-                <a:tab pos="3489960" algn="l"/>
-                <a:tab pos="4071620" algn="l"/>
-                <a:tab pos="4653280" algn="l"/>
-                <a:tab pos="5234940" algn="l"/>
-                <a:tab pos="5816600" algn="l"/>
-                <a:tab pos="6398260" algn="l"/>
-                <a:tab pos="6979920" algn="l"/>
-                <a:tab pos="7561580" algn="l"/>
-                <a:tab pos="8143240" algn="l"/>
-                <a:tab pos="8724900" algn="l"/>
-                <a:tab pos="9306560" algn="l"/>
-              </a:tabLst>
-            </a:pPr>
-            <a:r>
-              <a:rPr lang="en-US" sz="2800" i="1" dirty="0">
-                <a:solidFill>
-                  <a:srgbClr val="C70040"/>
-                </a:solidFill>
-                <a:ea typeface="Times New Roman" panose="02020603050405020304" pitchFamily="18" charset="0"/>
-              </a:rPr>
-              <a:t>                  </a:t>
-            </a:r>
-            <a:r>
-              <a:rPr lang="en-US" sz="2800" i="1" dirty="0" err="1">
-                <a:solidFill>
-                  <a:srgbClr val="427E00"/>
-                </a:solidFill>
-                <a:ea typeface="Times New Roman" panose="02020603050405020304" pitchFamily="18" charset="0"/>
-              </a:rPr>
-              <a:t>UniformProvider</a:t>
-            </a:r>
-            <a:r>
-              <a:rPr lang="en-US" sz="2800" dirty="0">
-                <a:solidFill>
-                  <a:srgbClr val="000000"/>
-                </a:solidFill>
-                <a:ea typeface="Times New Roman" panose="02020603050405020304" pitchFamily="18" charset="0"/>
-              </a:rPr>
-              <a:t>(</a:t>
-            </a:r>
-            <a:r>
-              <a:rPr lang="en-US" sz="2800" dirty="0">
-                <a:solidFill>
-                  <a:srgbClr val="8F8634"/>
-                </a:solidFill>
-                <a:ea typeface="Times New Roman" panose="02020603050405020304" pitchFamily="18" charset="0"/>
-              </a:rPr>
-              <a:t>"scene"</a:t>
-            </a:r>
-            <a:r>
-              <a:rPr lang="en-US" sz="2800" dirty="0">
-                <a:solidFill>
-                  <a:srgbClr val="000000"/>
-                </a:solidFill>
-                <a:ea typeface="Times New Roman" panose="02020603050405020304" pitchFamily="18" charset="0"/>
-              </a:rPr>
-              <a:t>){</a:t>
-            </a:r>
-            <a:endParaRPr lang="en-US" sz="2800" dirty="0">
-              <a:ea typeface="Calibri" panose="020F0502020204030204" pitchFamily="34" charset="0"/>
-            </a:endParaRPr>
-          </a:p>
-          <a:p>
-            <a:pPr>
-              <a:lnSpc>
-                <a:spcPct val="107000"/>
-              </a:lnSpc>
-              <a:spcAft>
-                <a:spcPts val="800"/>
-              </a:spcAft>
-            </a:pPr>
-            <a:endParaRPr lang="en-US" sz="2800" dirty="0">
-              <a:ea typeface="Calibri" panose="020F0502020204030204" pitchFamily="34" charset="0"/>
-            </a:endParaRPr>
-          </a:p>
-          <a:p>
-            <a:pPr>
-              <a:lnSpc>
-                <a:spcPct val="107000"/>
-              </a:lnSpc>
-              <a:spcAft>
-                <a:spcPts val="800"/>
-              </a:spcAft>
-            </a:pPr>
-            <a:endParaRPr lang="en-US" sz="2800" dirty="0">
-              <a:ea typeface="Calibri" panose="020F0502020204030204" pitchFamily="34" charset="0"/>
-            </a:endParaRPr>
-          </a:p>
-          <a:p>
-            <a:pPr>
-              <a:lnSpc>
-                <a:spcPct val="107000"/>
-              </a:lnSpc>
-              <a:spcAft>
-                <a:spcPts val="0"/>
-              </a:spcAft>
-              <a:tabLst>
-                <a:tab pos="581660" algn="l"/>
-                <a:tab pos="1163320" algn="l"/>
-                <a:tab pos="1744980" algn="l"/>
-                <a:tab pos="2326640" algn="l"/>
-                <a:tab pos="2908300" algn="l"/>
-                <a:tab pos="3489960" algn="l"/>
-                <a:tab pos="4071620" algn="l"/>
-                <a:tab pos="4653280" algn="l"/>
-                <a:tab pos="5234940" algn="l"/>
-                <a:tab pos="5816600" algn="l"/>
-                <a:tab pos="6398260" algn="l"/>
-                <a:tab pos="6979920" algn="l"/>
-                <a:tab pos="7561580" algn="l"/>
-                <a:tab pos="8143240" algn="l"/>
-                <a:tab pos="8724900" algn="l"/>
-                <a:tab pos="9306560" algn="l"/>
-              </a:tabLst>
-            </a:pPr>
-            <a:r>
-              <a:rPr lang="en-US" sz="2800" dirty="0" err="1">
-                <a:solidFill>
-                  <a:srgbClr val="000000"/>
-                </a:solidFill>
-                <a:ea typeface="Times New Roman" panose="02020603050405020304" pitchFamily="18" charset="0"/>
-              </a:rPr>
-              <a:t>addComponentsAndGatherUniforms</a:t>
-            </a:r>
-            <a:r>
-              <a:rPr lang="en-US" sz="2800" dirty="0">
-                <a:solidFill>
-                  <a:srgbClr val="000000"/>
-                </a:solidFill>
-                <a:ea typeface="Times New Roman" panose="02020603050405020304" pitchFamily="18" charset="0"/>
-              </a:rPr>
-              <a:t>(</a:t>
-            </a:r>
-            <a:r>
-              <a:rPr lang="en-US" sz="2800" dirty="0">
-                <a:solidFill>
-                  <a:srgbClr val="C70040"/>
-                </a:solidFill>
-                <a:ea typeface="Times New Roman" panose="02020603050405020304" pitchFamily="18" charset="0"/>
-              </a:rPr>
-              <a:t>*</a:t>
-            </a:r>
-            <a:r>
-              <a:rPr lang="en-US" sz="2800" dirty="0" err="1">
-                <a:solidFill>
-                  <a:srgbClr val="000000"/>
-                </a:solidFill>
-                <a:ea typeface="Times New Roman" panose="02020603050405020304" pitchFamily="18" charset="0"/>
-              </a:rPr>
-              <a:t>Program</a:t>
-            </a:r>
-            <a:r>
-              <a:rPr lang="en-US" sz="2800" dirty="0" err="1">
-                <a:solidFill>
-                  <a:srgbClr val="C70040"/>
-                </a:solidFill>
-                <a:ea typeface="Times New Roman" panose="02020603050405020304" pitchFamily="18" charset="0"/>
-              </a:rPr>
-              <a:t>.</a:t>
-            </a:r>
-            <a:r>
-              <a:rPr lang="en-US" sz="2800" dirty="0" err="1">
-                <a:solidFill>
-                  <a:srgbClr val="000000"/>
-                </a:solidFill>
-                <a:ea typeface="Times New Roman" panose="02020603050405020304" pitchFamily="18" charset="0"/>
-              </a:rPr>
-              <a:t>all</a:t>
-            </a:r>
-            <a:r>
-              <a:rPr lang="en-US" sz="2800" dirty="0">
-                <a:solidFill>
-                  <a:srgbClr val="000000"/>
-                </a:solidFill>
-                <a:ea typeface="Times New Roman" panose="02020603050405020304" pitchFamily="18" charset="0"/>
-              </a:rPr>
-              <a:t>)</a:t>
-            </a:r>
-          </a:p>
-          <a:p>
-            <a:pPr>
-              <a:lnSpc>
-                <a:spcPct val="107000"/>
-              </a:lnSpc>
-              <a:spcAft>
-                <a:spcPts val="0"/>
-              </a:spcAft>
-              <a:tabLst>
-                <a:tab pos="581660" algn="l"/>
-                <a:tab pos="1163320" algn="l"/>
-                <a:tab pos="1744980" algn="l"/>
-                <a:tab pos="2326640" algn="l"/>
-                <a:tab pos="2908300" algn="l"/>
-                <a:tab pos="3489960" algn="l"/>
-                <a:tab pos="4071620" algn="l"/>
-                <a:tab pos="4653280" algn="l"/>
-                <a:tab pos="5234940" algn="l"/>
-                <a:tab pos="5816600" algn="l"/>
-                <a:tab pos="6398260" algn="l"/>
-                <a:tab pos="6979920" algn="l"/>
-                <a:tab pos="7561580" algn="l"/>
-                <a:tab pos="8143240" algn="l"/>
-                <a:tab pos="8724900" algn="l"/>
-                <a:tab pos="9306560" algn="l"/>
-              </a:tabLst>
-            </a:pPr>
-            <a:endParaRPr lang="en-US" sz="2800" dirty="0">
-              <a:solidFill>
-                <a:srgbClr val="000000"/>
-              </a:solidFill>
-              <a:effectLst/>
-              <a:ea typeface="Calibri" panose="020F0502020204030204" pitchFamily="34" charset="0"/>
-            </a:endParaRPr>
-          </a:p>
-          <a:p>
-            <a:pPr lvl="0">
-              <a:lnSpc>
-                <a:spcPct val="107000"/>
-              </a:lnSpc>
-              <a:tabLst>
-                <a:tab pos="581660" algn="l"/>
-                <a:tab pos="1163320" algn="l"/>
-                <a:tab pos="1744980" algn="l"/>
-                <a:tab pos="2326640" algn="l"/>
-                <a:tab pos="2908300" algn="l"/>
-                <a:tab pos="3489960" algn="l"/>
-                <a:tab pos="4071620" algn="l"/>
-                <a:tab pos="4653280" algn="l"/>
-                <a:tab pos="5234940" algn="l"/>
-                <a:tab pos="5816600" algn="l"/>
-                <a:tab pos="6398260" algn="l"/>
-                <a:tab pos="6979920" algn="l"/>
-                <a:tab pos="7561580" algn="l"/>
-                <a:tab pos="8143240" algn="l"/>
-                <a:tab pos="8724900" algn="l"/>
-                <a:tab pos="9306560" algn="l"/>
-              </a:tabLst>
-            </a:pPr>
-            <a:r>
-              <a:rPr lang="en-US" sz="2800" dirty="0" err="1">
-                <a:solidFill>
-                  <a:srgbClr val="000000"/>
-                </a:solidFill>
-                <a:ea typeface="Times New Roman" panose="02020603050405020304" pitchFamily="18" charset="0"/>
-                <a:cs typeface="Times New Roman" panose="02020603050405020304" pitchFamily="18" charset="0"/>
-              </a:rPr>
-              <a:t>gameObjects</a:t>
-            </a:r>
-            <a:r>
-              <a:rPr lang="en-US" sz="2800" dirty="0" err="1">
-                <a:solidFill>
-                  <a:srgbClr val="C70040"/>
-                </a:solidFill>
-                <a:ea typeface="Times New Roman" panose="02020603050405020304" pitchFamily="18" charset="0"/>
-                <a:cs typeface="Times New Roman" panose="02020603050405020304" pitchFamily="18" charset="0"/>
-              </a:rPr>
-              <a:t>.</a:t>
-            </a:r>
-            <a:r>
-              <a:rPr lang="en-US" sz="2800" dirty="0" err="1">
-                <a:solidFill>
-                  <a:srgbClr val="000000"/>
-                </a:solidFill>
-                <a:ea typeface="Times New Roman" panose="02020603050405020304" pitchFamily="18" charset="0"/>
-                <a:cs typeface="Times New Roman" panose="02020603050405020304" pitchFamily="18" charset="0"/>
-              </a:rPr>
-              <a:t>forEach</a:t>
-            </a:r>
-            <a:r>
-              <a:rPr lang="en-US" sz="2800" dirty="0">
-                <a:solidFill>
-                  <a:srgbClr val="000000"/>
-                </a:solidFill>
-                <a:ea typeface="Times New Roman" panose="02020603050405020304" pitchFamily="18" charset="0"/>
-                <a:cs typeface="Times New Roman" panose="02020603050405020304" pitchFamily="18" charset="0"/>
-              </a:rPr>
-              <a:t>{ </a:t>
-            </a:r>
-            <a:r>
-              <a:rPr lang="en-US" sz="2800" dirty="0" err="1">
-                <a:solidFill>
-                  <a:srgbClr val="000000"/>
-                </a:solidFill>
-                <a:ea typeface="Times New Roman" panose="02020603050405020304" pitchFamily="18" charset="0"/>
-                <a:cs typeface="Times New Roman" panose="02020603050405020304" pitchFamily="18" charset="0"/>
-              </a:rPr>
-              <a:t>it</a:t>
-            </a:r>
-            <a:r>
-              <a:rPr lang="en-US" sz="2800" dirty="0" err="1">
-                <a:solidFill>
-                  <a:srgbClr val="C70040"/>
-                </a:solidFill>
-                <a:ea typeface="Times New Roman" panose="02020603050405020304" pitchFamily="18" charset="0"/>
-                <a:cs typeface="Times New Roman" panose="02020603050405020304" pitchFamily="18" charset="0"/>
-              </a:rPr>
-              <a:t>.</a:t>
-            </a:r>
-            <a:r>
-              <a:rPr lang="en-US" sz="2800" dirty="0" err="1">
-                <a:solidFill>
-                  <a:srgbClr val="000000"/>
-                </a:solidFill>
-                <a:ea typeface="Times New Roman" panose="02020603050405020304" pitchFamily="18" charset="0"/>
-                <a:cs typeface="Times New Roman" panose="02020603050405020304" pitchFamily="18" charset="0"/>
-              </a:rPr>
-              <a:t>draw</a:t>
-            </a:r>
-            <a:r>
-              <a:rPr lang="en-US" sz="2800" dirty="0">
-                <a:solidFill>
-                  <a:srgbClr val="000000"/>
-                </a:solidFill>
-                <a:ea typeface="Times New Roman" panose="02020603050405020304" pitchFamily="18" charset="0"/>
-                <a:cs typeface="Times New Roman" panose="02020603050405020304" pitchFamily="18" charset="0"/>
-              </a:rPr>
-              <a:t>(</a:t>
-            </a:r>
-            <a:r>
-              <a:rPr lang="hu-HU" sz="2800" dirty="0">
-                <a:solidFill>
-                  <a:srgbClr val="000000"/>
-                </a:solidFill>
-                <a:ea typeface="Times New Roman" panose="02020603050405020304" pitchFamily="18" charset="0"/>
-                <a:cs typeface="Times New Roman" panose="02020603050405020304" pitchFamily="18" charset="0"/>
-              </a:rPr>
-              <a:t> </a:t>
-            </a:r>
-            <a:r>
-              <a:rPr lang="en-US" sz="2800" dirty="0">
-                <a:solidFill>
-                  <a:srgbClr val="000000"/>
-                </a:solidFill>
-                <a:ea typeface="Times New Roman" panose="02020603050405020304" pitchFamily="18" charset="0"/>
-                <a:cs typeface="Times New Roman" panose="02020603050405020304" pitchFamily="18" charset="0"/>
-              </a:rPr>
-              <a:t>this, </a:t>
-            </a:r>
-            <a:r>
-              <a:rPr lang="hu-HU" sz="2800" dirty="0">
-                <a:solidFill>
-                  <a:srgbClr val="000000"/>
-                </a:solidFill>
-                <a:ea typeface="Times New Roman" panose="02020603050405020304" pitchFamily="18" charset="0"/>
-                <a:cs typeface="Times New Roman" panose="02020603050405020304" pitchFamily="18" charset="0"/>
-              </a:rPr>
-              <a:t>camera </a:t>
-            </a:r>
-            <a:r>
-              <a:rPr lang="en-US" sz="2800" dirty="0">
-                <a:solidFill>
-                  <a:srgbClr val="000000"/>
-                </a:solidFill>
-                <a:ea typeface="Times New Roman" panose="02020603050405020304" pitchFamily="18" charset="0"/>
-                <a:cs typeface="Times New Roman" panose="02020603050405020304" pitchFamily="18" charset="0"/>
-              </a:rPr>
-              <a:t>) }</a:t>
-            </a:r>
-            <a:endParaRPr lang="en-US" sz="1100" dirty="0">
-              <a:solidFill>
-                <a:prstClr val="black"/>
-              </a:solidFill>
-              <a:latin typeface="Calibri" panose="020F0502020204030204" pitchFamily="34" charset="0"/>
-              <a:ea typeface="Calibri" panose="020F0502020204030204" pitchFamily="34" charset="0"/>
-              <a:cs typeface="Times New Roman" panose="02020603050405020304" pitchFamily="18" charset="0"/>
-            </a:endParaRPr>
-          </a:p>
-          <a:p>
-            <a:pPr>
-              <a:lnSpc>
-                <a:spcPct val="107000"/>
-              </a:lnSpc>
-              <a:spcAft>
-                <a:spcPts val="0"/>
-              </a:spcAft>
-              <a:tabLst>
-                <a:tab pos="581660" algn="l"/>
-                <a:tab pos="1163320" algn="l"/>
-                <a:tab pos="1744980" algn="l"/>
-                <a:tab pos="2326640" algn="l"/>
-                <a:tab pos="2908300" algn="l"/>
-                <a:tab pos="3489960" algn="l"/>
-                <a:tab pos="4071620" algn="l"/>
-                <a:tab pos="4653280" algn="l"/>
-                <a:tab pos="5234940" algn="l"/>
-                <a:tab pos="5816600" algn="l"/>
-                <a:tab pos="6398260" algn="l"/>
-                <a:tab pos="6979920" algn="l"/>
-                <a:tab pos="7561580" algn="l"/>
-                <a:tab pos="8143240" algn="l"/>
-                <a:tab pos="8724900" algn="l"/>
-                <a:tab pos="9306560" algn="l"/>
-              </a:tabLst>
-            </a:pPr>
-            <a:endParaRPr lang="en-US" sz="2800" dirty="0">
-              <a:effectLst/>
-              <a:ea typeface="Calibri" panose="020F0502020204030204" pitchFamily="34" charset="0"/>
-            </a:endParaRPr>
-          </a:p>
-        </p:txBody>
-      </p:sp>
-    </p:spTree>
-    <p:extLst>
-      <p:ext uri="{BB962C8B-B14F-4D97-AF65-F5344CB8AC3E}">
-        <p14:creationId xmlns:p14="http://schemas.microsoft.com/office/powerpoint/2010/main" val="1391061798"/>
       </p:ext>
     </p:extLst>
   </p:cSld>
@@ -18173,11 +17553,25 @@
           </a:lstStyle>
           <a:p>
             <a:r>
-              <a:rPr lang="hu-HU" altLang="en-US" sz="1800" b="1" dirty="0">
+              <a:rPr lang="en-US" altLang="en-US" sz="1800" b="1" dirty="0">
                 <a:latin typeface="Courier New" panose="02070309020205020404" pitchFamily="49" charset="0"/>
                 <a:cs typeface="Courier New" panose="02070309020205020404" pitchFamily="49" charset="0"/>
               </a:rPr>
-              <a:t>new Mat4</a:t>
+              <a:t> </a:t>
+            </a:r>
+            <a:r>
+              <a:rPr lang="en-US" altLang="en-US" sz="1800" b="1" dirty="0" smtClean="0">
+                <a:latin typeface="Courier New" panose="02070309020205020404" pitchFamily="49" charset="0"/>
+                <a:cs typeface="Courier New" panose="02070309020205020404" pitchFamily="49" charset="0"/>
+              </a:rPr>
+              <a:t>   </a:t>
+            </a:r>
+            <a:r>
+              <a:rPr lang="hu-HU" altLang="en-US" sz="1800" b="1" dirty="0" smtClean="0">
+                <a:latin typeface="Courier New" panose="02070309020205020404" pitchFamily="49" charset="0"/>
+                <a:cs typeface="Courier New" panose="02070309020205020404" pitchFamily="49" charset="0"/>
+              </a:rPr>
+              <a:t>Mat4</a:t>
             </a:r>
             <a:r>
               <a:rPr lang="en-US" altLang="en-US" sz="1800" b="1" dirty="0">

</xml_diff>